<commit_message>
recompile labOutputs w Java 10
</commit_message>
<xml_diff>
--- a/078 Review keyPress - enter letter by letter/notes/reviewKeyPressLetterInput.pptx
+++ b/078 Review keyPress - enter letter by letter/notes/reviewKeyPressLetterInput.pptx
@@ -259,7 +259,7 @@
       </p15:sldGuideLst>
     </p:ext>
     <p:ext uri="http://customooxmlschemas.google.com/">
-      <go:slidesCustomData xmlns:go="http://customooxmlschemas.google.com/" xmlns:p15="http://schemas.microsoft.com/office/powerpoint/2012/main" xmlns:p14="http://schemas.microsoft.com/office/powerpoint/2010/main" xmlns:com="http://schemas.openxmlformats.org/drawingml/2006/compatibility" xmlns:pvml="urn:schemas-microsoft-com:office:powerpoint" xmlns:v="urn:schemas-microsoft-com:vml" xmlns:o="urn:schemas-microsoft-com:office:office" xmlns:dgm="http://schemas.openxmlformats.org/drawingml/2006/diagram" xmlns:c="http://schemas.openxmlformats.org/drawingml/2006/chart" xmlns:mv="urn:schemas-microsoft-com:mac:vml" xmlns:mc="http://schemas.openxmlformats.org/markup-compatibility/2006" xmlns="" r:id="rId9" roundtripDataSignature="AMtx7mhho5Eb2dsDfN42IR84qaza4uX0xQ=="/>
+      <go:slidesCustomData xmlns="" xmlns:mc="http://schemas.openxmlformats.org/markup-compatibility/2006" xmlns:mv="urn:schemas-microsoft-com:mac:vml" xmlns:c="http://schemas.openxmlformats.org/drawingml/2006/chart" xmlns:dgm="http://schemas.openxmlformats.org/drawingml/2006/diagram" xmlns:o="urn:schemas-microsoft-com:office:office" xmlns:v="urn:schemas-microsoft-com:vml" xmlns:pvml="urn:schemas-microsoft-com:office:powerpoint" xmlns:com="http://schemas.openxmlformats.org/drawingml/2006/compatibility" xmlns:p14="http://schemas.microsoft.com/office/powerpoint/2010/main" xmlns:p15="http://schemas.microsoft.com/office/powerpoint/2012/main" xmlns:go="http://customooxmlschemas.google.com/" r:id="rId9" roundtripDataSignature="AMtx7mhho5Eb2dsDfN42IR84qaza4uX0xQ=="/>
     </p:ext>
   </p:extLst>
 </p:presentation>
@@ -4562,7 +4562,7 @@
                 <a:cs typeface="Times New Roman"/>
                 <a:sym typeface="Times New Roman"/>
               </a:rPr>
-              <a:t>Up to this point your work has been focused on displaying the words to by typed by the user.</a:t>
+              <a:t>Up to this point your work has been focused on displaying the words to be typed by the user.</a:t>
             </a:r>
           </a:p>
           <a:p>

</xml_diff>